<commit_message>
minor slide change for image
</commit_message>
<xml_diff>
--- a/images/readme/readme_plots.pptx
+++ b/images/readme/readme_plots.pptx
@@ -6,7 +6,8 @@
   </p:sldMasterIdLst>
   <p:sldIdLst>
     <p:sldId id="257" r:id="rId2"/>
-    <p:sldId id="258" r:id="rId3"/>
+    <p:sldId id="259" r:id="rId3"/>
+    <p:sldId id="258" r:id="rId4"/>
   </p:sldIdLst>
   <p:sldSz cx="12192000" cy="6858000"/>
   <p:notesSz cx="6858000" cy="9144000"/>
@@ -3949,6 +3950,628 @@
           <a:chExt cx="0" cy="0"/>
         </a:xfrm>
       </p:grpSpPr>
+      <p:cxnSp>
+        <p:nvCxnSpPr>
+          <p:cNvPr id="9" name="Straight Arrow Connector 8">
+            <a:extLst>
+              <a:ext uri="{FF2B5EF4-FFF2-40B4-BE49-F238E27FC236}">
+                <a16:creationId xmlns:a16="http://schemas.microsoft.com/office/drawing/2014/main" id="{0E78940C-9485-7040-974F-DA9474A68D13}"/>
+              </a:ext>
+            </a:extLst>
+          </p:cNvPr>
+          <p:cNvCxnSpPr>
+            <a:cxnSpLocks/>
+          </p:cNvCxnSpPr>
+          <p:nvPr/>
+        </p:nvCxnSpPr>
+        <p:spPr>
+          <a:xfrm flipV="1">
+            <a:off x="3573517" y="1366345"/>
+            <a:ext cx="0" cy="3615558"/>
+          </a:xfrm>
+          <a:prstGeom prst="straightConnector1">
+            <a:avLst/>
+          </a:prstGeom>
+          <a:ln w="38100">
+            <a:solidFill>
+              <a:schemeClr val="tx1"/>
+            </a:solidFill>
+            <a:tailEnd type="triangle"/>
+          </a:ln>
+        </p:spPr>
+        <p:style>
+          <a:lnRef idx="1">
+            <a:schemeClr val="accent1"/>
+          </a:lnRef>
+          <a:fillRef idx="0">
+            <a:schemeClr val="accent1"/>
+          </a:fillRef>
+          <a:effectRef idx="0">
+            <a:schemeClr val="accent1"/>
+          </a:effectRef>
+          <a:fontRef idx="minor">
+            <a:schemeClr val="tx1"/>
+          </a:fontRef>
+        </p:style>
+      </p:cxnSp>
+      <p:cxnSp>
+        <p:nvCxnSpPr>
+          <p:cNvPr id="10" name="Straight Arrow Connector 9">
+            <a:extLst>
+              <a:ext uri="{FF2B5EF4-FFF2-40B4-BE49-F238E27FC236}">
+                <a16:creationId xmlns:a16="http://schemas.microsoft.com/office/drawing/2014/main" id="{2743FA1D-FC3C-4746-9FA1-4758FA0533C6}"/>
+              </a:ext>
+            </a:extLst>
+          </p:cNvPr>
+          <p:cNvCxnSpPr>
+            <a:cxnSpLocks/>
+          </p:cNvCxnSpPr>
+          <p:nvPr/>
+        </p:nvCxnSpPr>
+        <p:spPr>
+          <a:xfrm>
+            <a:off x="3573517" y="4981903"/>
+            <a:ext cx="4162097" cy="0"/>
+          </a:xfrm>
+          <a:prstGeom prst="straightConnector1">
+            <a:avLst/>
+          </a:prstGeom>
+          <a:ln w="38100">
+            <a:solidFill>
+              <a:schemeClr val="tx1"/>
+            </a:solidFill>
+            <a:tailEnd type="triangle"/>
+          </a:ln>
+        </p:spPr>
+        <p:style>
+          <a:lnRef idx="1">
+            <a:schemeClr val="accent1"/>
+          </a:lnRef>
+          <a:fillRef idx="0">
+            <a:schemeClr val="accent1"/>
+          </a:fillRef>
+          <a:effectRef idx="0">
+            <a:schemeClr val="accent1"/>
+          </a:effectRef>
+          <a:fontRef idx="minor">
+            <a:schemeClr val="tx1"/>
+          </a:fontRef>
+        </p:style>
+      </p:cxnSp>
+      <p:sp>
+        <p:nvSpPr>
+          <p:cNvPr id="13" name="TextBox 12">
+            <a:extLst>
+              <a:ext uri="{FF2B5EF4-FFF2-40B4-BE49-F238E27FC236}">
+                <a16:creationId xmlns:a16="http://schemas.microsoft.com/office/drawing/2014/main" id="{D46B7E04-C5C6-234E-9A1E-46170A3713D8}"/>
+              </a:ext>
+            </a:extLst>
+          </p:cNvPr>
+          <p:cNvSpPr txBox="1"/>
+          <p:nvPr/>
+        </p:nvSpPr>
+        <p:spPr>
+          <a:xfrm>
+            <a:off x="4726483" y="1992047"/>
+            <a:ext cx="809297" cy="369332"/>
+          </a:xfrm>
+          <a:prstGeom prst="rect">
+            <a:avLst/>
+          </a:prstGeom>
+          <a:noFill/>
+          <a:ln w="38100">
+            <a:solidFill>
+              <a:srgbClr val="00B050"/>
+            </a:solidFill>
+          </a:ln>
+          <a:effectLst>
+            <a:softEdge rad="0"/>
+          </a:effectLst>
+        </p:spPr>
+        <p:txBody>
+          <a:bodyPr wrap="square" rtlCol="0">
+            <a:spAutoFit/>
+          </a:bodyPr>
+          <a:lstStyle/>
+          <a:p>
+            <a:pPr algn="ctr"/>
+            <a:r>
+              <a:rPr lang="en-US" dirty="0"/>
+              <a:t>1.png</a:t>
+            </a:r>
+          </a:p>
+        </p:txBody>
+      </p:sp>
+      <p:sp>
+        <p:nvSpPr>
+          <p:cNvPr id="14" name="TextBox 13">
+            <a:extLst>
+              <a:ext uri="{FF2B5EF4-FFF2-40B4-BE49-F238E27FC236}">
+                <a16:creationId xmlns:a16="http://schemas.microsoft.com/office/drawing/2014/main" id="{6AA7B78B-79DF-634F-B1DE-1B28C8561FA3}"/>
+              </a:ext>
+            </a:extLst>
+          </p:cNvPr>
+          <p:cNvSpPr txBox="1"/>
+          <p:nvPr/>
+        </p:nvSpPr>
+        <p:spPr>
+          <a:xfrm>
+            <a:off x="4726485" y="2614092"/>
+            <a:ext cx="809297" cy="369332"/>
+          </a:xfrm>
+          <a:prstGeom prst="rect">
+            <a:avLst/>
+          </a:prstGeom>
+          <a:noFill/>
+          <a:ln w="38100">
+            <a:solidFill>
+              <a:srgbClr val="FF0000"/>
+            </a:solidFill>
+          </a:ln>
+          <a:effectLst>
+            <a:softEdge rad="0"/>
+          </a:effectLst>
+        </p:spPr>
+        <p:txBody>
+          <a:bodyPr wrap="square" rtlCol="0">
+            <a:spAutoFit/>
+          </a:bodyPr>
+          <a:lstStyle/>
+          <a:p>
+            <a:pPr algn="ctr"/>
+            <a:r>
+              <a:rPr lang="en-US" dirty="0"/>
+              <a:t>1.png</a:t>
+            </a:r>
+          </a:p>
+        </p:txBody>
+      </p:sp>
+      <p:sp>
+        <p:nvSpPr>
+          <p:cNvPr id="15" name="TextBox 14">
+            <a:extLst>
+              <a:ext uri="{FF2B5EF4-FFF2-40B4-BE49-F238E27FC236}">
+                <a16:creationId xmlns:a16="http://schemas.microsoft.com/office/drawing/2014/main" id="{78D1A1B6-302D-274C-99B8-F1B4B5BD9A60}"/>
+              </a:ext>
+            </a:extLst>
+          </p:cNvPr>
+          <p:cNvSpPr txBox="1"/>
+          <p:nvPr/>
+        </p:nvSpPr>
+        <p:spPr>
+          <a:xfrm>
+            <a:off x="4726484" y="3865031"/>
+            <a:ext cx="809297" cy="369332"/>
+          </a:xfrm>
+          <a:prstGeom prst="rect">
+            <a:avLst/>
+          </a:prstGeom>
+          <a:noFill/>
+          <a:ln w="38100">
+            <a:solidFill>
+              <a:srgbClr val="00B050"/>
+            </a:solidFill>
+          </a:ln>
+        </p:spPr>
+        <p:txBody>
+          <a:bodyPr wrap="square" rtlCol="0">
+            <a:spAutoFit/>
+          </a:bodyPr>
+          <a:lstStyle/>
+          <a:p>
+            <a:pPr algn="ctr"/>
+            <a:r>
+              <a:rPr lang="en-US" dirty="0"/>
+              <a:t>2.png</a:t>
+            </a:r>
+          </a:p>
+        </p:txBody>
+      </p:sp>
+      <p:sp>
+        <p:nvSpPr>
+          <p:cNvPr id="16" name="TextBox 15">
+            <a:extLst>
+              <a:ext uri="{FF2B5EF4-FFF2-40B4-BE49-F238E27FC236}">
+                <a16:creationId xmlns:a16="http://schemas.microsoft.com/office/drawing/2014/main" id="{B22652E4-87C3-D34F-8C06-F77A384F88A9}"/>
+              </a:ext>
+            </a:extLst>
+          </p:cNvPr>
+          <p:cNvSpPr txBox="1"/>
+          <p:nvPr/>
+        </p:nvSpPr>
+        <p:spPr>
+          <a:xfrm>
+            <a:off x="4726485" y="3294007"/>
+            <a:ext cx="809297" cy="369332"/>
+          </a:xfrm>
+          <a:prstGeom prst="rect">
+            <a:avLst/>
+          </a:prstGeom>
+          <a:noFill/>
+          <a:ln w="38100">
+            <a:solidFill>
+              <a:srgbClr val="FF0000"/>
+            </a:solidFill>
+          </a:ln>
+        </p:spPr>
+        <p:txBody>
+          <a:bodyPr wrap="square" rtlCol="0">
+            <a:spAutoFit/>
+          </a:bodyPr>
+          <a:lstStyle/>
+          <a:p>
+            <a:pPr algn="ctr"/>
+            <a:r>
+              <a:rPr lang="en-US" dirty="0"/>
+              <a:t>2.png</a:t>
+            </a:r>
+          </a:p>
+        </p:txBody>
+      </p:sp>
+      <p:sp>
+        <p:nvSpPr>
+          <p:cNvPr id="17" name="TextBox 16">
+            <a:extLst>
+              <a:ext uri="{FF2B5EF4-FFF2-40B4-BE49-F238E27FC236}">
+                <a16:creationId xmlns:a16="http://schemas.microsoft.com/office/drawing/2014/main" id="{97818277-4E6B-884D-AE5F-A8FC9C52A205}"/>
+              </a:ext>
+            </a:extLst>
+          </p:cNvPr>
+          <p:cNvSpPr txBox="1"/>
+          <p:nvPr/>
+        </p:nvSpPr>
+        <p:spPr>
+          <a:xfrm>
+            <a:off x="5846922" y="3931011"/>
+            <a:ext cx="809297" cy="369332"/>
+          </a:xfrm>
+          <a:prstGeom prst="rect">
+            <a:avLst/>
+          </a:prstGeom>
+          <a:noFill/>
+          <a:ln w="38100">
+            <a:solidFill>
+              <a:srgbClr val="00B050"/>
+            </a:solidFill>
+          </a:ln>
+          <a:effectLst>
+            <a:softEdge rad="0"/>
+          </a:effectLst>
+        </p:spPr>
+        <p:txBody>
+          <a:bodyPr wrap="square" rtlCol="0">
+            <a:spAutoFit/>
+          </a:bodyPr>
+          <a:lstStyle/>
+          <a:p>
+            <a:pPr algn="ctr"/>
+            <a:r>
+              <a:rPr lang="en-US" dirty="0"/>
+              <a:t>4.png</a:t>
+            </a:r>
+          </a:p>
+        </p:txBody>
+      </p:sp>
+      <p:sp>
+        <p:nvSpPr>
+          <p:cNvPr id="18" name="TextBox 17">
+            <a:extLst>
+              <a:ext uri="{FF2B5EF4-FFF2-40B4-BE49-F238E27FC236}">
+                <a16:creationId xmlns:a16="http://schemas.microsoft.com/office/drawing/2014/main" id="{B213347F-92B5-DE47-9CF4-3247901409A6}"/>
+              </a:ext>
+            </a:extLst>
+          </p:cNvPr>
+          <p:cNvSpPr txBox="1"/>
+          <p:nvPr/>
+        </p:nvSpPr>
+        <p:spPr>
+          <a:xfrm>
+            <a:off x="5846923" y="3294007"/>
+            <a:ext cx="809297" cy="369332"/>
+          </a:xfrm>
+          <a:prstGeom prst="rect">
+            <a:avLst/>
+          </a:prstGeom>
+          <a:noFill/>
+          <a:ln w="38100">
+            <a:solidFill>
+              <a:srgbClr val="FF0000"/>
+            </a:solidFill>
+          </a:ln>
+          <a:effectLst>
+            <a:softEdge rad="0"/>
+          </a:effectLst>
+        </p:spPr>
+        <p:txBody>
+          <a:bodyPr wrap="square" rtlCol="0">
+            <a:spAutoFit/>
+          </a:bodyPr>
+          <a:lstStyle/>
+          <a:p>
+            <a:pPr algn="ctr"/>
+            <a:r>
+              <a:rPr lang="en-US" dirty="0"/>
+              <a:t>4.png</a:t>
+            </a:r>
+          </a:p>
+        </p:txBody>
+      </p:sp>
+      <p:sp>
+        <p:nvSpPr>
+          <p:cNvPr id="19" name="TextBox 18">
+            <a:extLst>
+              <a:ext uri="{FF2B5EF4-FFF2-40B4-BE49-F238E27FC236}">
+                <a16:creationId xmlns:a16="http://schemas.microsoft.com/office/drawing/2014/main" id="{C374B673-E25A-6D4B-AF8C-79FA946CFE1E}"/>
+              </a:ext>
+            </a:extLst>
+          </p:cNvPr>
+          <p:cNvSpPr txBox="1"/>
+          <p:nvPr/>
+        </p:nvSpPr>
+        <p:spPr>
+          <a:xfrm>
+            <a:off x="5879448" y="1998505"/>
+            <a:ext cx="809297" cy="369332"/>
+          </a:xfrm>
+          <a:prstGeom prst="rect">
+            <a:avLst/>
+          </a:prstGeom>
+          <a:noFill/>
+          <a:ln w="38100">
+            <a:solidFill>
+              <a:srgbClr val="00B050"/>
+            </a:solidFill>
+          </a:ln>
+          <a:effectLst>
+            <a:softEdge rad="0"/>
+          </a:effectLst>
+        </p:spPr>
+        <p:txBody>
+          <a:bodyPr wrap="square" rtlCol="0">
+            <a:spAutoFit/>
+          </a:bodyPr>
+          <a:lstStyle/>
+          <a:p>
+            <a:pPr algn="ctr"/>
+            <a:r>
+              <a:rPr lang="en-US" dirty="0"/>
+              <a:t>3.png</a:t>
+            </a:r>
+          </a:p>
+        </p:txBody>
+      </p:sp>
+      <p:sp>
+        <p:nvSpPr>
+          <p:cNvPr id="20" name="TextBox 19">
+            <a:extLst>
+              <a:ext uri="{FF2B5EF4-FFF2-40B4-BE49-F238E27FC236}">
+                <a16:creationId xmlns:a16="http://schemas.microsoft.com/office/drawing/2014/main" id="{23EE62C8-6047-2045-B310-BCF97E0CB106}"/>
+              </a:ext>
+            </a:extLst>
+          </p:cNvPr>
+          <p:cNvSpPr txBox="1"/>
+          <p:nvPr/>
+        </p:nvSpPr>
+        <p:spPr>
+          <a:xfrm>
+            <a:off x="5846921" y="2616052"/>
+            <a:ext cx="809297" cy="369332"/>
+          </a:xfrm>
+          <a:prstGeom prst="rect">
+            <a:avLst/>
+          </a:prstGeom>
+          <a:noFill/>
+          <a:ln w="38100">
+            <a:solidFill>
+              <a:srgbClr val="FF0000"/>
+            </a:solidFill>
+          </a:ln>
+          <a:effectLst>
+            <a:softEdge rad="0"/>
+          </a:effectLst>
+        </p:spPr>
+        <p:txBody>
+          <a:bodyPr wrap="square" rtlCol="0">
+            <a:spAutoFit/>
+          </a:bodyPr>
+          <a:lstStyle/>
+          <a:p>
+            <a:pPr algn="ctr"/>
+            <a:r>
+              <a:rPr lang="en-US" dirty="0"/>
+              <a:t>3.png</a:t>
+            </a:r>
+          </a:p>
+        </p:txBody>
+      </p:sp>
+      <p:sp>
+        <p:nvSpPr>
+          <p:cNvPr id="22" name="TextBox 21">
+            <a:extLst>
+              <a:ext uri="{FF2B5EF4-FFF2-40B4-BE49-F238E27FC236}">
+                <a16:creationId xmlns:a16="http://schemas.microsoft.com/office/drawing/2014/main" id="{9E2ECBBB-0A57-3944-A03D-54E6875ED0BA}"/>
+              </a:ext>
+            </a:extLst>
+          </p:cNvPr>
+          <p:cNvSpPr txBox="1"/>
+          <p:nvPr/>
+        </p:nvSpPr>
+        <p:spPr>
+          <a:xfrm>
+            <a:off x="7735614" y="4797237"/>
+            <a:ext cx="1594022" cy="369332"/>
+          </a:xfrm>
+          <a:prstGeom prst="rect">
+            <a:avLst/>
+          </a:prstGeom>
+          <a:noFill/>
+        </p:spPr>
+        <p:txBody>
+          <a:bodyPr wrap="square" rtlCol="0">
+            <a:spAutoFit/>
+          </a:bodyPr>
+          <a:lstStyle/>
+          <a:p>
+            <a:r>
+              <a:rPr lang="en-US" dirty="0"/>
+              <a:t>complexity</a:t>
+            </a:r>
+          </a:p>
+        </p:txBody>
+      </p:sp>
+      <p:sp>
+        <p:nvSpPr>
+          <p:cNvPr id="23" name="TextBox 22">
+            <a:extLst>
+              <a:ext uri="{FF2B5EF4-FFF2-40B4-BE49-F238E27FC236}">
+                <a16:creationId xmlns:a16="http://schemas.microsoft.com/office/drawing/2014/main" id="{D0F77F44-4BE4-154C-8A4A-D6FAFA7ECDA8}"/>
+              </a:ext>
+            </a:extLst>
+          </p:cNvPr>
+          <p:cNvSpPr txBox="1"/>
+          <p:nvPr/>
+        </p:nvSpPr>
+        <p:spPr>
+          <a:xfrm>
+            <a:off x="3054534" y="997012"/>
+            <a:ext cx="1345318" cy="369332"/>
+          </a:xfrm>
+          <a:prstGeom prst="rect">
+            <a:avLst/>
+          </a:prstGeom>
+          <a:noFill/>
+        </p:spPr>
+        <p:txBody>
+          <a:bodyPr wrap="square" rtlCol="0">
+            <a:spAutoFit/>
+          </a:bodyPr>
+          <a:lstStyle/>
+          <a:p>
+            <a:r>
+              <a:rPr lang="en-US" dirty="0"/>
+              <a:t>similarity</a:t>
+            </a:r>
+          </a:p>
+        </p:txBody>
+      </p:sp>
+      <p:sp>
+        <p:nvSpPr>
+          <p:cNvPr id="24" name="TextBox 23">
+            <a:extLst>
+              <a:ext uri="{FF2B5EF4-FFF2-40B4-BE49-F238E27FC236}">
+                <a16:creationId xmlns:a16="http://schemas.microsoft.com/office/drawing/2014/main" id="{69EE6652-C11E-0A43-B5AB-36EF0E1D43A7}"/>
+              </a:ext>
+            </a:extLst>
+          </p:cNvPr>
+          <p:cNvSpPr txBox="1"/>
+          <p:nvPr/>
+        </p:nvSpPr>
+        <p:spPr>
+          <a:xfrm>
+            <a:off x="9131928" y="2851595"/>
+            <a:ext cx="1594018" cy="369332"/>
+          </a:xfrm>
+          <a:prstGeom prst="rect">
+            <a:avLst/>
+          </a:prstGeom>
+          <a:noFill/>
+          <a:ln w="38100">
+            <a:solidFill>
+              <a:srgbClr val="00B050"/>
+            </a:solidFill>
+          </a:ln>
+          <a:effectLst>
+            <a:softEdge rad="0"/>
+          </a:effectLst>
+        </p:spPr>
+        <p:txBody>
+          <a:bodyPr wrap="square" rtlCol="0">
+            <a:spAutoFit/>
+          </a:bodyPr>
+          <a:lstStyle/>
+          <a:p>
+            <a:pPr algn="ctr"/>
+            <a:r>
+              <a:rPr lang="en-US" dirty="0"/>
+              <a:t>background</a:t>
+            </a:r>
+          </a:p>
+        </p:txBody>
+      </p:sp>
+      <p:sp>
+        <p:nvSpPr>
+          <p:cNvPr id="26" name="TextBox 25">
+            <a:extLst>
+              <a:ext uri="{FF2B5EF4-FFF2-40B4-BE49-F238E27FC236}">
+                <a16:creationId xmlns:a16="http://schemas.microsoft.com/office/drawing/2014/main" id="{89CF7467-455F-0843-9D4E-93AD411AFB89}"/>
+              </a:ext>
+            </a:extLst>
+          </p:cNvPr>
+          <p:cNvSpPr txBox="1"/>
+          <p:nvPr/>
+        </p:nvSpPr>
+        <p:spPr>
+          <a:xfrm>
+            <a:off x="9131928" y="3429000"/>
+            <a:ext cx="1594014" cy="369332"/>
+          </a:xfrm>
+          <a:prstGeom prst="rect">
+            <a:avLst/>
+          </a:prstGeom>
+          <a:noFill/>
+          <a:ln w="38100">
+            <a:solidFill>
+              <a:srgbClr val="FF0000"/>
+            </a:solidFill>
+          </a:ln>
+          <a:effectLst>
+            <a:softEdge rad="0"/>
+          </a:effectLst>
+        </p:spPr>
+        <p:txBody>
+          <a:bodyPr wrap="square" rtlCol="0">
+            <a:spAutoFit/>
+          </a:bodyPr>
+          <a:lstStyle/>
+          <a:p>
+            <a:pPr algn="ctr"/>
+            <a:r>
+              <a:rPr lang="en-US" dirty="0"/>
+              <a:t>deviant</a:t>
+            </a:r>
+          </a:p>
+        </p:txBody>
+      </p:sp>
+    </p:spTree>
+    <p:extLst>
+      <p:ext uri="{BB962C8B-B14F-4D97-AF65-F5344CB8AC3E}">
+        <p14:creationId xmlns:p14="http://schemas.microsoft.com/office/powerpoint/2010/main" val="3307346320"/>
+      </p:ext>
+    </p:extLst>
+  </p:cSld>
+  <p:clrMapOvr>
+    <a:masterClrMapping/>
+  </p:clrMapOvr>
+</p:sld>
+</file>
+
+<file path=ppt/slides/slide3.xml><?xml version="1.0" encoding="utf-8"?>
+<p:sld xmlns:a="http://schemas.openxmlformats.org/drawingml/2006/main" xmlns:r="http://schemas.openxmlformats.org/officeDocument/2006/relationships" xmlns:p="http://schemas.openxmlformats.org/presentationml/2006/main">
+  <p:cSld>
+    <p:spTree>
+      <p:nvGrpSpPr>
+        <p:cNvPr id="1" name=""/>
+        <p:cNvGrpSpPr/>
+        <p:nvPr/>
+      </p:nvGrpSpPr>
+      <p:grpSpPr>
+        <a:xfrm>
+          <a:off x="0" y="0"/>
+          <a:ext cx="0" cy="0"/>
+          <a:chOff x="0" y="0"/>
+          <a:chExt cx="0" cy="0"/>
+        </a:xfrm>
+      </p:grpSpPr>
       <p:sp>
         <p:nvSpPr>
           <p:cNvPr id="5" name="TextBox 4">

</xml_diff>

<commit_message>
slightly enlarged images, added captions and finished readme page
</commit_message>
<xml_diff>
--- a/images/readme/readme_plots.pptx
+++ b/images/readme/readme_plots.pptx
@@ -261,7 +261,7 @@
           <a:p>
             <a:fld id="{9B19FB73-FA71-BF49-B317-0A037B5898D2}" type="datetimeFigureOut">
               <a:rPr lang="en-US" smtClean="0"/>
-              <a:t>12/14/20</a:t>
+              <a:t>12/15/20</a:t>
             </a:fld>
             <a:endParaRPr lang="en-US"/>
           </a:p>
@@ -459,7 +459,7 @@
           <a:p>
             <a:fld id="{9B19FB73-FA71-BF49-B317-0A037B5898D2}" type="datetimeFigureOut">
               <a:rPr lang="en-US" smtClean="0"/>
-              <a:t>12/14/20</a:t>
+              <a:t>12/15/20</a:t>
             </a:fld>
             <a:endParaRPr lang="en-US"/>
           </a:p>
@@ -667,7 +667,7 @@
           <a:p>
             <a:fld id="{9B19FB73-FA71-BF49-B317-0A037B5898D2}" type="datetimeFigureOut">
               <a:rPr lang="en-US" smtClean="0"/>
-              <a:t>12/14/20</a:t>
+              <a:t>12/15/20</a:t>
             </a:fld>
             <a:endParaRPr lang="en-US"/>
           </a:p>
@@ -865,7 +865,7 @@
           <a:p>
             <a:fld id="{9B19FB73-FA71-BF49-B317-0A037B5898D2}" type="datetimeFigureOut">
               <a:rPr lang="en-US" smtClean="0"/>
-              <a:t>12/14/20</a:t>
+              <a:t>12/15/20</a:t>
             </a:fld>
             <a:endParaRPr lang="en-US"/>
           </a:p>
@@ -1140,7 +1140,7 @@
           <a:p>
             <a:fld id="{9B19FB73-FA71-BF49-B317-0A037B5898D2}" type="datetimeFigureOut">
               <a:rPr lang="en-US" smtClean="0"/>
-              <a:t>12/14/20</a:t>
+              <a:t>12/15/20</a:t>
             </a:fld>
             <a:endParaRPr lang="en-US"/>
           </a:p>
@@ -1405,7 +1405,7 @@
           <a:p>
             <a:fld id="{9B19FB73-FA71-BF49-B317-0A037B5898D2}" type="datetimeFigureOut">
               <a:rPr lang="en-US" smtClean="0"/>
-              <a:t>12/14/20</a:t>
+              <a:t>12/15/20</a:t>
             </a:fld>
             <a:endParaRPr lang="en-US"/>
           </a:p>
@@ -1817,7 +1817,7 @@
           <a:p>
             <a:fld id="{9B19FB73-FA71-BF49-B317-0A037B5898D2}" type="datetimeFigureOut">
               <a:rPr lang="en-US" smtClean="0"/>
-              <a:t>12/14/20</a:t>
+              <a:t>12/15/20</a:t>
             </a:fld>
             <a:endParaRPr lang="en-US"/>
           </a:p>
@@ -1958,7 +1958,7 @@
           <a:p>
             <a:fld id="{9B19FB73-FA71-BF49-B317-0A037B5898D2}" type="datetimeFigureOut">
               <a:rPr lang="en-US" smtClean="0"/>
-              <a:t>12/14/20</a:t>
+              <a:t>12/15/20</a:t>
             </a:fld>
             <a:endParaRPr lang="en-US"/>
           </a:p>
@@ -2071,7 +2071,7 @@
           <a:p>
             <a:fld id="{9B19FB73-FA71-BF49-B317-0A037B5898D2}" type="datetimeFigureOut">
               <a:rPr lang="en-US" smtClean="0"/>
-              <a:t>12/14/20</a:t>
+              <a:t>12/15/20</a:t>
             </a:fld>
             <a:endParaRPr lang="en-US"/>
           </a:p>
@@ -2382,7 +2382,7 @@
           <a:p>
             <a:fld id="{9B19FB73-FA71-BF49-B317-0A037B5898D2}" type="datetimeFigureOut">
               <a:rPr lang="en-US" smtClean="0"/>
-              <a:t>12/14/20</a:t>
+              <a:t>12/15/20</a:t>
             </a:fld>
             <a:endParaRPr lang="en-US"/>
           </a:p>
@@ -2670,7 +2670,7 @@
           <a:p>
             <a:fld id="{9B19FB73-FA71-BF49-B317-0A037B5898D2}" type="datetimeFigureOut">
               <a:rPr lang="en-US" smtClean="0"/>
-              <a:t>12/14/20</a:t>
+              <a:t>12/15/20</a:t>
             </a:fld>
             <a:endParaRPr lang="en-US"/>
           </a:p>
@@ -2911,7 +2911,7 @@
           <a:p>
             <a:fld id="{9B19FB73-FA71-BF49-B317-0A037B5898D2}" type="datetimeFigureOut">
               <a:rPr lang="en-US" smtClean="0"/>
-              <a:t>12/14/20</a:t>
+              <a:t>12/15/20</a:t>
             </a:fld>
             <a:endParaRPr lang="en-US"/>
           </a:p>
@@ -3344,8 +3344,8 @@
         </p:nvCxnSpPr>
         <p:spPr>
           <a:xfrm flipV="1">
-            <a:off x="3573517" y="1366345"/>
-            <a:ext cx="0" cy="3615558"/>
+            <a:off x="2000155" y="378372"/>
+            <a:ext cx="0" cy="4621776"/>
           </a:xfrm>
           <a:prstGeom prst="straightConnector1">
             <a:avLst/>
@@ -3388,8 +3388,8 @@
         </p:nvCxnSpPr>
         <p:spPr>
           <a:xfrm>
-            <a:off x="3573517" y="4981903"/>
-            <a:ext cx="4162097" cy="0"/>
+            <a:off x="1979135" y="4981903"/>
+            <a:ext cx="5756479" cy="0"/>
           </a:xfrm>
           <a:prstGeom prst="straightConnector1">
             <a:avLst/>
@@ -3430,8 +3430,8 @@
         </p:nvSpPr>
         <p:spPr>
           <a:xfrm>
-            <a:off x="4109542" y="1826410"/>
-            <a:ext cx="809297" cy="369332"/>
+            <a:off x="2819959" y="950415"/>
+            <a:ext cx="924906" cy="369332"/>
           </a:xfrm>
           <a:prstGeom prst="rect">
             <a:avLst/>
@@ -3474,8 +3474,8 @@
         </p:nvSpPr>
         <p:spPr>
           <a:xfrm>
-            <a:off x="4109541" y="2279824"/>
-            <a:ext cx="809297" cy="369332"/>
+            <a:off x="2819958" y="1403829"/>
+            <a:ext cx="924906" cy="369332"/>
           </a:xfrm>
           <a:prstGeom prst="rect">
             <a:avLst/>
@@ -3518,8 +3518,8 @@
         </p:nvSpPr>
         <p:spPr>
           <a:xfrm>
-            <a:off x="4092501" y="4148483"/>
-            <a:ext cx="809297" cy="369332"/>
+            <a:off x="2819959" y="3884471"/>
+            <a:ext cx="924906" cy="369332"/>
           </a:xfrm>
           <a:prstGeom prst="rect">
             <a:avLst/>
@@ -3559,8 +3559,8 @@
         </p:nvSpPr>
         <p:spPr>
           <a:xfrm>
-            <a:off x="4092500" y="3686818"/>
-            <a:ext cx="809297" cy="369332"/>
+            <a:off x="2819958" y="3422806"/>
+            <a:ext cx="924906" cy="369332"/>
           </a:xfrm>
           <a:prstGeom prst="rect">
             <a:avLst/>
@@ -3600,8 +3600,8 @@
         </p:nvSpPr>
         <p:spPr>
           <a:xfrm>
-            <a:off x="6432330" y="4159157"/>
-            <a:ext cx="809297" cy="369332"/>
+            <a:off x="6096000" y="3907792"/>
+            <a:ext cx="924906" cy="369332"/>
           </a:xfrm>
           <a:prstGeom prst="rect">
             <a:avLst/>
@@ -3644,8 +3644,8 @@
         </p:nvSpPr>
         <p:spPr>
           <a:xfrm>
-            <a:off x="6432330" y="3680365"/>
-            <a:ext cx="809297" cy="369332"/>
+            <a:off x="6096000" y="3429000"/>
+            <a:ext cx="924906" cy="369332"/>
           </a:xfrm>
           <a:prstGeom prst="rect">
             <a:avLst/>
@@ -3688,8 +3688,8 @@
         </p:nvSpPr>
         <p:spPr>
           <a:xfrm>
-            <a:off x="6432331" y="1829038"/>
-            <a:ext cx="809297" cy="369332"/>
+            <a:off x="6096001" y="950415"/>
+            <a:ext cx="924906" cy="369332"/>
           </a:xfrm>
           <a:prstGeom prst="rect">
             <a:avLst/>
@@ -3732,8 +3732,8 @@
         </p:nvSpPr>
         <p:spPr>
           <a:xfrm>
-            <a:off x="6432330" y="2282452"/>
-            <a:ext cx="809297" cy="369332"/>
+            <a:off x="6096000" y="1403829"/>
+            <a:ext cx="924906" cy="369332"/>
           </a:xfrm>
           <a:prstGeom prst="rect">
             <a:avLst/>
@@ -3811,7 +3811,7 @@
         </p:nvSpPr>
         <p:spPr>
           <a:xfrm>
-            <a:off x="3054534" y="997012"/>
+            <a:off x="1474641" y="9040"/>
             <a:ext cx="1345318" cy="369332"/>
           </a:xfrm>
           <a:prstGeom prst="rect">
@@ -3846,7 +3846,7 @@
         </p:nvSpPr>
         <p:spPr>
           <a:xfrm>
-            <a:off x="9131928" y="2851595"/>
+            <a:off x="8532627" y="2060763"/>
             <a:ext cx="1594018" cy="369332"/>
           </a:xfrm>
           <a:prstGeom prst="rect">
@@ -3890,7 +3890,7 @@
         </p:nvSpPr>
         <p:spPr>
           <a:xfrm>
-            <a:off x="9131928" y="3429000"/>
+            <a:off x="8532627" y="2638168"/>
             <a:ext cx="1594014" cy="369332"/>
           </a:xfrm>
           <a:prstGeom prst="rect">
@@ -3916,6 +3916,45 @@
             <a:r>
               <a:rPr lang="en-US" dirty="0"/>
               <a:t>deviant</a:t>
+            </a:r>
+          </a:p>
+        </p:txBody>
+      </p:sp>
+      <p:sp>
+        <p:nvSpPr>
+          <p:cNvPr id="2" name="TextBox 1">
+            <a:extLst>
+              <a:ext uri="{FF2B5EF4-FFF2-40B4-BE49-F238E27FC236}">
+                <a16:creationId xmlns:a16="http://schemas.microsoft.com/office/drawing/2014/main" id="{2BEDFC94-353F-E44B-9E50-D7ECA9082EBA}"/>
+              </a:ext>
+            </a:extLst>
+          </p:cNvPr>
+          <p:cNvSpPr txBox="1"/>
+          <p:nvPr/>
+        </p:nvSpPr>
+        <p:spPr>
+          <a:xfrm>
+            <a:off x="1474641" y="5924838"/>
+            <a:ext cx="7949800" cy="369332"/>
+          </a:xfrm>
+          <a:prstGeom prst="rect">
+            <a:avLst/>
+          </a:prstGeom>
+          <a:noFill/>
+        </p:spPr>
+        <p:txBody>
+          <a:bodyPr wrap="square" rtlCol="0">
+            <a:spAutoFit/>
+          </a:bodyPr>
+          <a:lstStyle/>
+          <a:p>
+            <a:r>
+              <a:rPr lang="en-US" b="1" dirty="0"/>
+              <a:t>Figure 1: </a:t>
+            </a:r>
+            <a:r>
+              <a:rPr lang="en-US" dirty="0"/>
+              <a:t>The complexity and similarity structure of background and deviant stimuli </a:t>
             </a:r>
           </a:p>
         </p:txBody>
@@ -4586,7 +4625,7 @@
         </p:nvSpPr>
         <p:spPr>
           <a:xfrm>
-            <a:off x="3806584" y="1293645"/>
+            <a:off x="4237509" y="642003"/>
             <a:ext cx="914400" cy="369332"/>
           </a:xfrm>
           <a:prstGeom prst="rect">
@@ -4630,7 +4669,7 @@
         </p:nvSpPr>
         <p:spPr>
           <a:xfrm>
-            <a:off x="2632692" y="1293645"/>
+            <a:off x="3063617" y="642003"/>
             <a:ext cx="914400" cy="369332"/>
           </a:xfrm>
           <a:prstGeom prst="rect">
@@ -4674,7 +4713,7 @@
         </p:nvSpPr>
         <p:spPr>
           <a:xfrm>
-            <a:off x="1458800" y="1293645"/>
+            <a:off x="1889725" y="642003"/>
             <a:ext cx="914400" cy="369332"/>
           </a:xfrm>
           <a:prstGeom prst="rect">
@@ -4718,7 +4757,7 @@
         </p:nvSpPr>
         <p:spPr>
           <a:xfrm>
-            <a:off x="284908" y="1293645"/>
+            <a:off x="715833" y="642003"/>
             <a:ext cx="914400" cy="369332"/>
           </a:xfrm>
           <a:prstGeom prst="rect">
@@ -4762,7 +4801,7 @@
         </p:nvSpPr>
         <p:spPr>
           <a:xfrm>
-            <a:off x="4980476" y="1293645"/>
+            <a:off x="5411401" y="642003"/>
             <a:ext cx="914400" cy="369332"/>
           </a:xfrm>
           <a:prstGeom prst="rect">
@@ -4806,7 +4845,7 @@
         </p:nvSpPr>
         <p:spPr>
           <a:xfrm>
-            <a:off x="6154368" y="1293645"/>
+            <a:off x="6585293" y="642003"/>
             <a:ext cx="914400" cy="369332"/>
           </a:xfrm>
           <a:prstGeom prst="rect">
@@ -4850,7 +4889,7 @@
         </p:nvSpPr>
         <p:spPr>
           <a:xfrm>
-            <a:off x="7328260" y="1293645"/>
+            <a:off x="7759185" y="642003"/>
             <a:ext cx="914400" cy="369332"/>
           </a:xfrm>
           <a:prstGeom prst="rect">
@@ -4894,7 +4933,7 @@
         </p:nvSpPr>
         <p:spPr>
           <a:xfrm>
-            <a:off x="8502150" y="1293645"/>
+            <a:off x="8933075" y="642003"/>
             <a:ext cx="914400" cy="369332"/>
           </a:xfrm>
           <a:prstGeom prst="rect">
@@ -4938,7 +4977,7 @@
         </p:nvSpPr>
         <p:spPr>
           <a:xfrm>
-            <a:off x="3806584" y="5041844"/>
+            <a:off x="4237509" y="4390202"/>
             <a:ext cx="914400" cy="369332"/>
           </a:xfrm>
           <a:prstGeom prst="rect">
@@ -4982,7 +5021,7 @@
         </p:nvSpPr>
         <p:spPr>
           <a:xfrm>
-            <a:off x="2632692" y="5041844"/>
+            <a:off x="3063617" y="4390202"/>
             <a:ext cx="914400" cy="369332"/>
           </a:xfrm>
           <a:prstGeom prst="rect">
@@ -5026,7 +5065,7 @@
         </p:nvSpPr>
         <p:spPr>
           <a:xfrm>
-            <a:off x="1458800" y="5041844"/>
+            <a:off x="1889725" y="4390202"/>
             <a:ext cx="914400" cy="369332"/>
           </a:xfrm>
           <a:prstGeom prst="rect">
@@ -5070,7 +5109,7 @@
         </p:nvSpPr>
         <p:spPr>
           <a:xfrm>
-            <a:off x="284908" y="5041844"/>
+            <a:off x="715833" y="4390202"/>
             <a:ext cx="914400" cy="369332"/>
           </a:xfrm>
           <a:prstGeom prst="rect">
@@ -5114,7 +5153,7 @@
         </p:nvSpPr>
         <p:spPr>
           <a:xfrm>
-            <a:off x="4980476" y="5041844"/>
+            <a:off x="5411401" y="4390202"/>
             <a:ext cx="914400" cy="369332"/>
           </a:xfrm>
           <a:prstGeom prst="rect">
@@ -5158,7 +5197,7 @@
         </p:nvSpPr>
         <p:spPr>
           <a:xfrm>
-            <a:off x="6154368" y="5041844"/>
+            <a:off x="6585293" y="4390202"/>
             <a:ext cx="914400" cy="369332"/>
           </a:xfrm>
           <a:prstGeom prst="rect">
@@ -5202,7 +5241,7 @@
         </p:nvSpPr>
         <p:spPr>
           <a:xfrm>
-            <a:off x="7328260" y="5041844"/>
+            <a:off x="7759185" y="4390202"/>
             <a:ext cx="914400" cy="369332"/>
           </a:xfrm>
           <a:prstGeom prst="rect">
@@ -5246,7 +5285,7 @@
         </p:nvSpPr>
         <p:spPr>
           <a:xfrm>
-            <a:off x="8502150" y="5041844"/>
+            <a:off x="8933075" y="4390202"/>
             <a:ext cx="914400" cy="369332"/>
           </a:xfrm>
           <a:prstGeom prst="rect">
@@ -5290,7 +5329,7 @@
         </p:nvSpPr>
         <p:spPr>
           <a:xfrm>
-            <a:off x="1705518" y="3244334"/>
+            <a:off x="2136443" y="2592692"/>
             <a:ext cx="1594018" cy="369332"/>
           </a:xfrm>
           <a:prstGeom prst="rect">
@@ -5334,7 +5373,7 @@
         </p:nvSpPr>
         <p:spPr>
           <a:xfrm>
-            <a:off x="6438156" y="3244334"/>
+            <a:off x="6869081" y="2592692"/>
             <a:ext cx="1594014" cy="369332"/>
           </a:xfrm>
           <a:prstGeom prst="rect">
@@ -5378,7 +5417,7 @@
         </p:nvSpPr>
         <p:spPr>
           <a:xfrm rot="16200000">
-            <a:off x="2195434" y="2898068"/>
+            <a:off x="2626359" y="2246426"/>
             <a:ext cx="457200" cy="3334634"/>
           </a:xfrm>
           <a:prstGeom prst="rightBrace">
@@ -5429,7 +5468,7 @@
         </p:nvCxnSpPr>
         <p:spPr>
           <a:xfrm>
-            <a:off x="284908" y="3429000"/>
+            <a:off x="715833" y="2777358"/>
             <a:ext cx="1420610" cy="0"/>
           </a:xfrm>
           <a:prstGeom prst="line">
@@ -5466,12 +5505,14 @@
               </a:ext>
             </a:extLst>
           </p:cNvPr>
-          <p:cNvCxnSpPr/>
+          <p:cNvCxnSpPr>
+            <a:cxnSpLocks/>
+          </p:cNvCxnSpPr>
           <p:nvPr/>
         </p:nvCxnSpPr>
         <p:spPr>
           <a:xfrm>
-            <a:off x="3300374" y="3429000"/>
+            <a:off x="3731299" y="2777358"/>
             <a:ext cx="1420610" cy="0"/>
           </a:xfrm>
           <a:prstGeom prst="line">
@@ -5508,12 +5549,14 @@
               </a:ext>
             </a:extLst>
           </p:cNvPr>
-          <p:cNvCxnSpPr/>
+          <p:cNvCxnSpPr>
+            <a:cxnSpLocks/>
+          </p:cNvCxnSpPr>
           <p:nvPr/>
         </p:nvCxnSpPr>
         <p:spPr>
           <a:xfrm>
-            <a:off x="5017546" y="3414584"/>
+            <a:off x="5448471" y="2762942"/>
             <a:ext cx="1420610" cy="0"/>
           </a:xfrm>
           <a:prstGeom prst="line">
@@ -5550,12 +5593,14 @@
               </a:ext>
             </a:extLst>
           </p:cNvPr>
-          <p:cNvCxnSpPr/>
+          <p:cNvCxnSpPr>
+            <a:cxnSpLocks/>
+          </p:cNvCxnSpPr>
           <p:nvPr/>
         </p:nvCxnSpPr>
         <p:spPr>
           <a:xfrm>
-            <a:off x="8062130" y="3400168"/>
+            <a:off x="8493055" y="2748526"/>
             <a:ext cx="1420610" cy="0"/>
           </a:xfrm>
           <a:prstGeom prst="line">
@@ -5597,7 +5642,7 @@
         </p:nvSpPr>
         <p:spPr>
           <a:xfrm rot="5400000">
-            <a:off x="2195434" y="487042"/>
+            <a:off x="2626359" y="-164600"/>
             <a:ext cx="457200" cy="3334634"/>
           </a:xfrm>
           <a:prstGeom prst="rightBrace">
@@ -5641,12 +5686,14 @@
               </a:ext>
             </a:extLst>
           </p:cNvPr>
-          <p:cNvCxnSpPr/>
+          <p:cNvCxnSpPr>
+            <a:cxnSpLocks/>
+          </p:cNvCxnSpPr>
           <p:nvPr/>
         </p:nvCxnSpPr>
         <p:spPr>
           <a:xfrm flipV="1">
-            <a:off x="2454790" y="3643040"/>
+            <a:off x="2885715" y="2991398"/>
             <a:ext cx="0" cy="308919"/>
           </a:xfrm>
           <a:prstGeom prst="straightConnector1">
@@ -5685,7 +5732,7 @@
         </p:nvSpPr>
         <p:spPr>
           <a:xfrm>
-            <a:off x="1997236" y="3951959"/>
+            <a:off x="2428161" y="3300317"/>
             <a:ext cx="2013443" cy="338554"/>
           </a:xfrm>
           <a:prstGeom prst="rect">
@@ -5722,7 +5769,7 @@
         </p:nvCxnSpPr>
         <p:spPr>
           <a:xfrm>
-            <a:off x="2454790" y="2789320"/>
+            <a:off x="2885715" y="2137678"/>
             <a:ext cx="0" cy="357105"/>
           </a:xfrm>
           <a:prstGeom prst="straightConnector1">
@@ -5764,7 +5811,7 @@
         </p:nvSpPr>
         <p:spPr>
           <a:xfrm>
-            <a:off x="1953079" y="2450766"/>
+            <a:off x="2384004" y="1799124"/>
             <a:ext cx="1594013" cy="338554"/>
           </a:xfrm>
           <a:prstGeom prst="rect">
@@ -5799,7 +5846,7 @@
         </p:nvSpPr>
         <p:spPr>
           <a:xfrm>
-            <a:off x="371414" y="3294104"/>
+            <a:off x="802339" y="2642462"/>
             <a:ext cx="710298" cy="276999"/>
           </a:xfrm>
           <a:prstGeom prst="rect">
@@ -5838,7 +5885,7 @@
         </p:nvSpPr>
         <p:spPr>
           <a:xfrm>
-            <a:off x="4034960" y="3287926"/>
+            <a:off x="4465885" y="2636284"/>
             <a:ext cx="710298" cy="276999"/>
           </a:xfrm>
           <a:prstGeom prst="rect">
@@ -5872,12 +5919,14 @@
               </a:ext>
             </a:extLst>
           </p:cNvPr>
-          <p:cNvCxnSpPr/>
+          <p:cNvCxnSpPr>
+            <a:cxnSpLocks/>
+          </p:cNvCxnSpPr>
           <p:nvPr/>
         </p:nvCxnSpPr>
         <p:spPr>
           <a:xfrm>
-            <a:off x="640064" y="1859949"/>
+            <a:off x="1070989" y="1208307"/>
             <a:ext cx="0" cy="1329982"/>
           </a:xfrm>
           <a:prstGeom prst="straightConnector1">
@@ -5925,7 +5974,7 @@
         </p:nvCxnSpPr>
         <p:spPr>
           <a:xfrm flipV="1">
-            <a:off x="640064" y="3657173"/>
+            <a:off x="1070989" y="3005531"/>
             <a:ext cx="0" cy="1136812"/>
           </a:xfrm>
           <a:prstGeom prst="straightConnector1">
@@ -5966,12 +6015,14 @@
               </a:ext>
             </a:extLst>
           </p:cNvPr>
-          <p:cNvCxnSpPr/>
+          <p:cNvCxnSpPr>
+            <a:cxnSpLocks/>
+          </p:cNvCxnSpPr>
           <p:nvPr/>
         </p:nvCxnSpPr>
         <p:spPr>
           <a:xfrm>
-            <a:off x="4301781" y="1895113"/>
+            <a:off x="4732706" y="1243471"/>
             <a:ext cx="0" cy="1329982"/>
           </a:xfrm>
           <a:prstGeom prst="straightConnector1">
@@ -6019,7 +6070,7 @@
         </p:nvCxnSpPr>
         <p:spPr>
           <a:xfrm flipV="1">
-            <a:off x="4301781" y="3692337"/>
+            <a:off x="4732706" y="3040695"/>
             <a:ext cx="0" cy="1101648"/>
           </a:xfrm>
           <a:prstGeom prst="straightConnector1">
@@ -6067,7 +6118,7 @@
         </p:nvCxnSpPr>
         <p:spPr>
           <a:xfrm flipV="1">
-            <a:off x="1892918" y="3692337"/>
+            <a:off x="2323843" y="3040695"/>
             <a:ext cx="0" cy="1136812"/>
           </a:xfrm>
           <a:prstGeom prst="straightConnector1">
@@ -6115,7 +6166,7 @@
         </p:nvCxnSpPr>
         <p:spPr>
           <a:xfrm flipV="1">
-            <a:off x="3121058" y="3720738"/>
+            <a:off x="3551983" y="3069096"/>
             <a:ext cx="0" cy="1136812"/>
           </a:xfrm>
           <a:prstGeom prst="straightConnector1">
@@ -6156,12 +6207,14 @@
               </a:ext>
             </a:extLst>
           </p:cNvPr>
-          <p:cNvCxnSpPr/>
+          <p:cNvCxnSpPr>
+            <a:cxnSpLocks/>
+          </p:cNvCxnSpPr>
           <p:nvPr/>
         </p:nvCxnSpPr>
         <p:spPr>
           <a:xfrm>
-            <a:off x="1929988" y="1849817"/>
+            <a:off x="2360913" y="1198175"/>
             <a:ext cx="0" cy="1329982"/>
           </a:xfrm>
           <a:prstGeom prst="straightConnector1">
@@ -6202,12 +6255,14 @@
               </a:ext>
             </a:extLst>
           </p:cNvPr>
-          <p:cNvCxnSpPr/>
+          <p:cNvCxnSpPr>
+            <a:cxnSpLocks/>
+          </p:cNvCxnSpPr>
           <p:nvPr/>
         </p:nvCxnSpPr>
         <p:spPr>
           <a:xfrm>
-            <a:off x="3089892" y="1849817"/>
+            <a:off x="3520817" y="1198175"/>
             <a:ext cx="0" cy="1329982"/>
           </a:xfrm>
           <a:prstGeom prst="straightConnector1">
@@ -6253,7 +6308,7 @@
         </p:nvSpPr>
         <p:spPr>
           <a:xfrm>
-            <a:off x="5115568" y="3261668"/>
+            <a:off x="5546493" y="2610026"/>
             <a:ext cx="710298" cy="276999"/>
           </a:xfrm>
           <a:prstGeom prst="rect">
@@ -6292,7 +6347,7 @@
         </p:nvSpPr>
         <p:spPr>
           <a:xfrm>
-            <a:off x="8779114" y="3255490"/>
+            <a:off x="9210039" y="2603848"/>
             <a:ext cx="710298" cy="276999"/>
           </a:xfrm>
           <a:prstGeom prst="rect">
@@ -6326,12 +6381,14 @@
               </a:ext>
             </a:extLst>
           </p:cNvPr>
-          <p:cNvCxnSpPr/>
+          <p:cNvCxnSpPr>
+            <a:cxnSpLocks/>
+          </p:cNvCxnSpPr>
           <p:nvPr/>
         </p:nvCxnSpPr>
         <p:spPr>
           <a:xfrm>
-            <a:off x="5352108" y="1859949"/>
+            <a:off x="5783033" y="1208307"/>
             <a:ext cx="0" cy="1329982"/>
           </a:xfrm>
           <a:prstGeom prst="straightConnector1">
@@ -6372,12 +6429,14 @@
               </a:ext>
             </a:extLst>
           </p:cNvPr>
-          <p:cNvCxnSpPr/>
+          <p:cNvCxnSpPr>
+            <a:cxnSpLocks/>
+          </p:cNvCxnSpPr>
           <p:nvPr/>
         </p:nvCxnSpPr>
         <p:spPr>
           <a:xfrm>
-            <a:off x="9013825" y="1895113"/>
+            <a:off x="9444750" y="1243471"/>
             <a:ext cx="0" cy="1329982"/>
           </a:xfrm>
           <a:prstGeom prst="straightConnector1">
@@ -6418,12 +6477,14 @@
               </a:ext>
             </a:extLst>
           </p:cNvPr>
-          <p:cNvCxnSpPr/>
+          <p:cNvCxnSpPr>
+            <a:cxnSpLocks/>
+          </p:cNvCxnSpPr>
           <p:nvPr/>
         </p:nvCxnSpPr>
         <p:spPr>
           <a:xfrm>
-            <a:off x="6642032" y="1849817"/>
+            <a:off x="7072957" y="1198175"/>
             <a:ext cx="0" cy="1329982"/>
           </a:xfrm>
           <a:prstGeom prst="straightConnector1">
@@ -6464,12 +6525,14 @@
               </a:ext>
             </a:extLst>
           </p:cNvPr>
-          <p:cNvCxnSpPr/>
+          <p:cNvCxnSpPr>
+            <a:cxnSpLocks/>
+          </p:cNvCxnSpPr>
           <p:nvPr/>
         </p:nvCxnSpPr>
         <p:spPr>
           <a:xfrm>
-            <a:off x="7801936" y="1849817"/>
+            <a:off x="8232861" y="1198175"/>
             <a:ext cx="0" cy="1329982"/>
           </a:xfrm>
           <a:prstGeom prst="straightConnector1">
@@ -6515,7 +6578,7 @@
         </p:nvSpPr>
         <p:spPr>
           <a:xfrm rot="5400000">
-            <a:off x="6940821" y="4177552"/>
+            <a:off x="7371746" y="3525910"/>
             <a:ext cx="457200" cy="3334634"/>
           </a:xfrm>
           <a:prstGeom prst="rightBrace">
@@ -6564,7 +6627,7 @@
         </p:nvSpPr>
         <p:spPr>
           <a:xfrm rot="5400000">
-            <a:off x="6940821" y="487043"/>
+            <a:off x="7371746" y="-164599"/>
             <a:ext cx="457200" cy="3334634"/>
           </a:xfrm>
           <a:prstGeom prst="rightBrace">
@@ -6615,7 +6678,7 @@
         </p:nvCxnSpPr>
         <p:spPr>
           <a:xfrm>
-            <a:off x="7175567" y="2821972"/>
+            <a:off x="7606492" y="2170330"/>
             <a:ext cx="0" cy="357105"/>
           </a:xfrm>
           <a:prstGeom prst="straightConnector1">
@@ -6657,7 +6720,7 @@
         </p:nvSpPr>
         <p:spPr>
           <a:xfrm>
-            <a:off x="6673856" y="2483418"/>
+            <a:off x="7104781" y="1831776"/>
             <a:ext cx="1594013" cy="338554"/>
           </a:xfrm>
           <a:prstGeom prst="rect">
@@ -6692,7 +6755,7 @@
         </p:nvSpPr>
         <p:spPr>
           <a:xfrm>
-            <a:off x="6372414" y="6242821"/>
+            <a:off x="6803339" y="5591179"/>
             <a:ext cx="1594014" cy="369332"/>
           </a:xfrm>
           <a:prstGeom prst="rect">
@@ -6734,7 +6797,7 @@
         </p:nvSpPr>
         <p:spPr>
           <a:xfrm>
-            <a:off x="10064152" y="3146425"/>
+            <a:off x="10495077" y="2494783"/>
             <a:ext cx="1330699" cy="646331"/>
           </a:xfrm>
           <a:prstGeom prst="rect">
@@ -6767,6 +6830,45 @@
             <a:r>
               <a:rPr lang="en-US" b="1" dirty="0"/>
               <a:t>probes</a:t>
+            </a:r>
+          </a:p>
+        </p:txBody>
+      </p:sp>
+      <p:sp>
+        <p:nvSpPr>
+          <p:cNvPr id="55" name="TextBox 54">
+            <a:extLst>
+              <a:ext uri="{FF2B5EF4-FFF2-40B4-BE49-F238E27FC236}">
+                <a16:creationId xmlns:a16="http://schemas.microsoft.com/office/drawing/2014/main" id="{F9A6695A-480B-1B41-B12D-0E72FEF17C39}"/>
+              </a:ext>
+            </a:extLst>
+          </p:cNvPr>
+          <p:cNvSpPr txBox="1"/>
+          <p:nvPr/>
+        </p:nvSpPr>
+        <p:spPr>
+          <a:xfrm>
+            <a:off x="2553655" y="6329754"/>
+            <a:ext cx="6458755" cy="369332"/>
+          </a:xfrm>
+          <a:prstGeom prst="rect">
+            <a:avLst/>
+          </a:prstGeom>
+          <a:noFill/>
+        </p:spPr>
+        <p:txBody>
+          <a:bodyPr wrap="square" rtlCol="0">
+            <a:spAutoFit/>
+          </a:bodyPr>
+          <a:lstStyle/>
+          <a:p>
+            <a:r>
+              <a:rPr lang="en-US" b="1" dirty="0"/>
+              <a:t>Figure 2: </a:t>
+            </a:r>
+            <a:r>
+              <a:rPr lang="en-US" dirty="0"/>
+              <a:t>The numbering scheme for the memory probe file names</a:t>
             </a:r>
           </a:p>
         </p:txBody>

</xml_diff>

<commit_message>
hacky solution to present stimuli
</commit_message>
<xml_diff>
--- a/images/readme/readme_plots.pptx
+++ b/images/readme/readme_plots.pptx
@@ -8,6 +8,7 @@
     <p:sldId id="257" r:id="rId2"/>
     <p:sldId id="259" r:id="rId3"/>
     <p:sldId id="258" r:id="rId4"/>
+    <p:sldId id="260" r:id="rId5"/>
   </p:sldIdLst>
   <p:sldSz cx="12192000" cy="6858000"/>
   <p:notesSz cx="6858000" cy="9144000"/>
@@ -261,7 +262,7 @@
           <a:p>
             <a:fld id="{9B19FB73-FA71-BF49-B317-0A037B5898D2}" type="datetimeFigureOut">
               <a:rPr lang="en-US" smtClean="0"/>
-              <a:t>12/15/20</a:t>
+              <a:t>12/18/20</a:t>
             </a:fld>
             <a:endParaRPr lang="en-US"/>
           </a:p>
@@ -459,7 +460,7 @@
           <a:p>
             <a:fld id="{9B19FB73-FA71-BF49-B317-0A037B5898D2}" type="datetimeFigureOut">
               <a:rPr lang="en-US" smtClean="0"/>
-              <a:t>12/15/20</a:t>
+              <a:t>12/18/20</a:t>
             </a:fld>
             <a:endParaRPr lang="en-US"/>
           </a:p>
@@ -667,7 +668,7 @@
           <a:p>
             <a:fld id="{9B19FB73-FA71-BF49-B317-0A037B5898D2}" type="datetimeFigureOut">
               <a:rPr lang="en-US" smtClean="0"/>
-              <a:t>12/15/20</a:t>
+              <a:t>12/18/20</a:t>
             </a:fld>
             <a:endParaRPr lang="en-US"/>
           </a:p>
@@ -865,7 +866,7 @@
           <a:p>
             <a:fld id="{9B19FB73-FA71-BF49-B317-0A037B5898D2}" type="datetimeFigureOut">
               <a:rPr lang="en-US" smtClean="0"/>
-              <a:t>12/15/20</a:t>
+              <a:t>12/18/20</a:t>
             </a:fld>
             <a:endParaRPr lang="en-US"/>
           </a:p>
@@ -1140,7 +1141,7 @@
           <a:p>
             <a:fld id="{9B19FB73-FA71-BF49-B317-0A037B5898D2}" type="datetimeFigureOut">
               <a:rPr lang="en-US" smtClean="0"/>
-              <a:t>12/15/20</a:t>
+              <a:t>12/18/20</a:t>
             </a:fld>
             <a:endParaRPr lang="en-US"/>
           </a:p>
@@ -1405,7 +1406,7 @@
           <a:p>
             <a:fld id="{9B19FB73-FA71-BF49-B317-0A037B5898D2}" type="datetimeFigureOut">
               <a:rPr lang="en-US" smtClean="0"/>
-              <a:t>12/15/20</a:t>
+              <a:t>12/18/20</a:t>
             </a:fld>
             <a:endParaRPr lang="en-US"/>
           </a:p>
@@ -1817,7 +1818,7 @@
           <a:p>
             <a:fld id="{9B19FB73-FA71-BF49-B317-0A037B5898D2}" type="datetimeFigureOut">
               <a:rPr lang="en-US" smtClean="0"/>
-              <a:t>12/15/20</a:t>
+              <a:t>12/18/20</a:t>
             </a:fld>
             <a:endParaRPr lang="en-US"/>
           </a:p>
@@ -1958,7 +1959,7 @@
           <a:p>
             <a:fld id="{9B19FB73-FA71-BF49-B317-0A037B5898D2}" type="datetimeFigureOut">
               <a:rPr lang="en-US" smtClean="0"/>
-              <a:t>12/15/20</a:t>
+              <a:t>12/18/20</a:t>
             </a:fld>
             <a:endParaRPr lang="en-US"/>
           </a:p>
@@ -2071,7 +2072,7 @@
           <a:p>
             <a:fld id="{9B19FB73-FA71-BF49-B317-0A037B5898D2}" type="datetimeFigureOut">
               <a:rPr lang="en-US" smtClean="0"/>
-              <a:t>12/15/20</a:t>
+              <a:t>12/18/20</a:t>
             </a:fld>
             <a:endParaRPr lang="en-US"/>
           </a:p>
@@ -2382,7 +2383,7 @@
           <a:p>
             <a:fld id="{9B19FB73-FA71-BF49-B317-0A037B5898D2}" type="datetimeFigureOut">
               <a:rPr lang="en-US" smtClean="0"/>
-              <a:t>12/15/20</a:t>
+              <a:t>12/18/20</a:t>
             </a:fld>
             <a:endParaRPr lang="en-US"/>
           </a:p>
@@ -2670,7 +2671,7 @@
           <a:p>
             <a:fld id="{9B19FB73-FA71-BF49-B317-0A037B5898D2}" type="datetimeFigureOut">
               <a:rPr lang="en-US" smtClean="0"/>
-              <a:t>12/15/20</a:t>
+              <a:t>12/18/20</a:t>
             </a:fld>
             <a:endParaRPr lang="en-US"/>
           </a:p>
@@ -2911,7 +2912,7 @@
           <a:p>
             <a:fld id="{9B19FB73-FA71-BF49-B317-0A037B5898D2}" type="datetimeFigureOut">
               <a:rPr lang="en-US" smtClean="0"/>
-              <a:t>12/15/20</a:t>
+              <a:t>12/18/20</a:t>
             </a:fld>
             <a:endParaRPr lang="en-US"/>
           </a:p>
@@ -6886,6 +6887,439 @@
 </p:sld>
 </file>
 
+<file path=ppt/slides/slide4.xml><?xml version="1.0" encoding="utf-8"?>
+<p:sld xmlns:a="http://schemas.openxmlformats.org/drawingml/2006/main" xmlns:r="http://schemas.openxmlformats.org/officeDocument/2006/relationships" xmlns:p="http://schemas.openxmlformats.org/presentationml/2006/main">
+  <p:cSld>
+    <p:spTree>
+      <p:nvGrpSpPr>
+        <p:cNvPr id="1" name=""/>
+        <p:cNvGrpSpPr/>
+        <p:nvPr/>
+      </p:nvGrpSpPr>
+      <p:grpSpPr>
+        <a:xfrm>
+          <a:off x="0" y="0"/>
+          <a:ext cx="0" cy="0"/>
+          <a:chOff x="0" y="0"/>
+          <a:chExt cx="0" cy="0"/>
+        </a:xfrm>
+      </p:grpSpPr>
+      <p:sp>
+        <p:nvSpPr>
+          <p:cNvPr id="4" name="TextBox 3">
+            <a:extLst>
+              <a:ext uri="{FF2B5EF4-FFF2-40B4-BE49-F238E27FC236}">
+                <a16:creationId xmlns:a16="http://schemas.microsoft.com/office/drawing/2014/main" id="{B6B1C736-08E6-DE4C-8D43-1BEE11C56A85}"/>
+              </a:ext>
+            </a:extLst>
+          </p:cNvPr>
+          <p:cNvSpPr txBox="1"/>
+          <p:nvPr/>
+        </p:nvSpPr>
+        <p:spPr>
+          <a:xfrm>
+            <a:off x="1591733" y="1786316"/>
+            <a:ext cx="3323474" cy="369332"/>
+          </a:xfrm>
+          <a:prstGeom prst="rect">
+            <a:avLst/>
+          </a:prstGeom>
+          <a:noFill/>
+        </p:spPr>
+        <p:txBody>
+          <a:bodyPr wrap="none" rtlCol="0">
+            <a:spAutoFit/>
+          </a:bodyPr>
+          <a:lstStyle/>
+          <a:p>
+            <a:r>
+              <a:rPr lang="en-US" dirty="0"/>
+              <a:t>Very hacky way to present stimuli</a:t>
+            </a:r>
+          </a:p>
+        </p:txBody>
+      </p:sp>
+      <p:cxnSp>
+        <p:nvCxnSpPr>
+          <p:cNvPr id="5" name="Straight Arrow Connector 4">
+            <a:extLst>
+              <a:ext uri="{FF2B5EF4-FFF2-40B4-BE49-F238E27FC236}">
+                <a16:creationId xmlns:a16="http://schemas.microsoft.com/office/drawing/2014/main" id="{CCDFFED4-1BDC-894C-998A-38958B2B31AC}"/>
+              </a:ext>
+            </a:extLst>
+          </p:cNvPr>
+          <p:cNvCxnSpPr>
+            <a:cxnSpLocks/>
+          </p:cNvCxnSpPr>
+          <p:nvPr/>
+        </p:nvCxnSpPr>
+        <p:spPr>
+          <a:xfrm>
+            <a:off x="740005" y="5715681"/>
+            <a:ext cx="5355995" cy="0"/>
+          </a:xfrm>
+          <a:prstGeom prst="straightConnector1">
+            <a:avLst/>
+          </a:prstGeom>
+          <a:ln w="38100">
+            <a:solidFill>
+              <a:schemeClr val="tx1"/>
+            </a:solidFill>
+            <a:tailEnd type="triangle"/>
+          </a:ln>
+        </p:spPr>
+        <p:style>
+          <a:lnRef idx="1">
+            <a:schemeClr val="accent1"/>
+          </a:lnRef>
+          <a:fillRef idx="0">
+            <a:schemeClr val="accent1"/>
+          </a:fillRef>
+          <a:effectRef idx="0">
+            <a:schemeClr val="accent1"/>
+          </a:effectRef>
+          <a:fontRef idx="minor">
+            <a:schemeClr val="tx1"/>
+          </a:fontRef>
+        </p:style>
+      </p:cxnSp>
+      <p:sp>
+        <p:nvSpPr>
+          <p:cNvPr id="7" name="Oval 6">
+            <a:extLst>
+              <a:ext uri="{FF2B5EF4-FFF2-40B4-BE49-F238E27FC236}">
+                <a16:creationId xmlns:a16="http://schemas.microsoft.com/office/drawing/2014/main" id="{CEF492BF-3888-514E-B3B3-9011383F4BA3}"/>
+              </a:ext>
+            </a:extLst>
+          </p:cNvPr>
+          <p:cNvSpPr/>
+          <p:nvPr/>
+        </p:nvSpPr>
+        <p:spPr>
+          <a:xfrm>
+            <a:off x="880533" y="3646311"/>
+            <a:ext cx="1862667" cy="778933"/>
+          </a:xfrm>
+          <a:prstGeom prst="ellipse">
+            <a:avLst/>
+          </a:prstGeom>
+        </p:spPr>
+        <p:style>
+          <a:lnRef idx="2">
+            <a:schemeClr val="accent1">
+              <a:shade val="50000"/>
+            </a:schemeClr>
+          </a:lnRef>
+          <a:fillRef idx="1">
+            <a:schemeClr val="accent1"/>
+          </a:fillRef>
+          <a:effectRef idx="0">
+            <a:schemeClr val="accent1"/>
+          </a:effectRef>
+          <a:fontRef idx="minor">
+            <a:schemeClr val="lt1"/>
+          </a:fontRef>
+        </p:style>
+        <p:txBody>
+          <a:bodyPr rtlCol="0" anchor="ctr"/>
+          <a:lstStyle/>
+          <a:p>
+            <a:pPr algn="ctr"/>
+            <a:r>
+              <a:rPr lang="en-US" dirty="0"/>
+              <a:t>Poke ball open animation</a:t>
+            </a:r>
+          </a:p>
+        </p:txBody>
+      </p:sp>
+      <p:sp>
+        <p:nvSpPr>
+          <p:cNvPr id="8" name="Rectangle 7">
+            <a:extLst>
+              <a:ext uri="{FF2B5EF4-FFF2-40B4-BE49-F238E27FC236}">
+                <a16:creationId xmlns:a16="http://schemas.microsoft.com/office/drawing/2014/main" id="{89FF583F-ADFE-9B4C-AC7B-B12C9760F8B0}"/>
+              </a:ext>
+            </a:extLst>
+          </p:cNvPr>
+          <p:cNvSpPr/>
+          <p:nvPr/>
+        </p:nvSpPr>
+        <p:spPr>
+          <a:xfrm>
+            <a:off x="1117599" y="2650067"/>
+            <a:ext cx="1444978" cy="778933"/>
+          </a:xfrm>
+          <a:prstGeom prst="rect">
+            <a:avLst/>
+          </a:prstGeom>
+          <a:solidFill>
+            <a:schemeClr val="accent2"/>
+          </a:solidFill>
+        </p:spPr>
+        <p:style>
+          <a:lnRef idx="2">
+            <a:schemeClr val="accent6"/>
+          </a:lnRef>
+          <a:fillRef idx="1">
+            <a:schemeClr val="lt1"/>
+          </a:fillRef>
+          <a:effectRef idx="0">
+            <a:schemeClr val="accent6"/>
+          </a:effectRef>
+          <a:fontRef idx="minor">
+            <a:schemeClr val="dk1"/>
+          </a:fontRef>
+        </p:style>
+        <p:txBody>
+          <a:bodyPr rtlCol="0" anchor="ctr"/>
+          <a:lstStyle/>
+          <a:p>
+            <a:pPr algn="ctr"/>
+            <a:r>
+              <a:rPr lang="en-US" dirty="0"/>
+              <a:t>Place holder for stimuli</a:t>
+            </a:r>
+          </a:p>
+        </p:txBody>
+      </p:sp>
+      <p:sp>
+        <p:nvSpPr>
+          <p:cNvPr id="9" name="Oval 8">
+            <a:extLst>
+              <a:ext uri="{FF2B5EF4-FFF2-40B4-BE49-F238E27FC236}">
+                <a16:creationId xmlns:a16="http://schemas.microsoft.com/office/drawing/2014/main" id="{73A00C58-F828-C44F-A804-6FA091B3AA3D}"/>
+              </a:ext>
+            </a:extLst>
+          </p:cNvPr>
+          <p:cNvSpPr/>
+          <p:nvPr/>
+        </p:nvSpPr>
+        <p:spPr>
+          <a:xfrm>
+            <a:off x="3809999" y="3646311"/>
+            <a:ext cx="1862667" cy="778933"/>
+          </a:xfrm>
+          <a:prstGeom prst="ellipse">
+            <a:avLst/>
+          </a:prstGeom>
+        </p:spPr>
+        <p:style>
+          <a:lnRef idx="2">
+            <a:schemeClr val="accent1">
+              <a:shade val="50000"/>
+            </a:schemeClr>
+          </a:lnRef>
+          <a:fillRef idx="1">
+            <a:schemeClr val="accent1"/>
+          </a:fillRef>
+          <a:effectRef idx="0">
+            <a:schemeClr val="accent1"/>
+          </a:effectRef>
+          <a:fontRef idx="minor">
+            <a:schemeClr val="lt1"/>
+          </a:fontRef>
+        </p:style>
+        <p:txBody>
+          <a:bodyPr rtlCol="0" anchor="ctr"/>
+          <a:lstStyle/>
+          <a:p>
+            <a:pPr algn="ctr"/>
+            <a:r>
+              <a:rPr lang="en-US" dirty="0"/>
+              <a:t>Poke ball opened still</a:t>
+            </a:r>
+          </a:p>
+        </p:txBody>
+      </p:sp>
+      <p:sp>
+        <p:nvSpPr>
+          <p:cNvPr id="10" name="Rectangle 9">
+            <a:extLst>
+              <a:ext uri="{FF2B5EF4-FFF2-40B4-BE49-F238E27FC236}">
+                <a16:creationId xmlns:a16="http://schemas.microsoft.com/office/drawing/2014/main" id="{EC2744FB-50D4-8745-A48A-F927006404F4}"/>
+              </a:ext>
+            </a:extLst>
+          </p:cNvPr>
+          <p:cNvSpPr/>
+          <p:nvPr/>
+        </p:nvSpPr>
+        <p:spPr>
+          <a:xfrm>
+            <a:off x="4018843" y="2679661"/>
+            <a:ext cx="1444978" cy="778933"/>
+          </a:xfrm>
+          <a:prstGeom prst="rect">
+            <a:avLst/>
+          </a:prstGeom>
+          <a:solidFill>
+            <a:schemeClr val="accent2"/>
+          </a:solidFill>
+        </p:spPr>
+        <p:style>
+          <a:lnRef idx="2">
+            <a:schemeClr val="accent6"/>
+          </a:lnRef>
+          <a:fillRef idx="1">
+            <a:schemeClr val="lt1"/>
+          </a:fillRef>
+          <a:effectRef idx="0">
+            <a:schemeClr val="accent6"/>
+          </a:effectRef>
+          <a:fontRef idx="minor">
+            <a:schemeClr val="dk1"/>
+          </a:fontRef>
+        </p:style>
+        <p:txBody>
+          <a:bodyPr rtlCol="0" anchor="ctr"/>
+          <a:lstStyle/>
+          <a:p>
+            <a:pPr algn="ctr"/>
+            <a:r>
+              <a:rPr lang="en-US" dirty="0"/>
+              <a:t>Stimuli</a:t>
+            </a:r>
+          </a:p>
+          <a:p>
+            <a:pPr algn="ctr"/>
+            <a:r>
+              <a:rPr lang="en-US" dirty="0"/>
+              <a:t>Gif starts playing</a:t>
+            </a:r>
+          </a:p>
+        </p:txBody>
+      </p:sp>
+      <p:sp>
+        <p:nvSpPr>
+          <p:cNvPr id="12" name="TextBox 11">
+            <a:extLst>
+              <a:ext uri="{FF2B5EF4-FFF2-40B4-BE49-F238E27FC236}">
+                <a16:creationId xmlns:a16="http://schemas.microsoft.com/office/drawing/2014/main" id="{B41CB255-8409-074C-A31A-DEA80C5A6DE9}"/>
+              </a:ext>
+            </a:extLst>
+          </p:cNvPr>
+          <p:cNvSpPr txBox="1"/>
+          <p:nvPr/>
+        </p:nvSpPr>
+        <p:spPr>
+          <a:xfrm>
+            <a:off x="5384800" y="5858933"/>
+            <a:ext cx="614271" cy="369332"/>
+          </a:xfrm>
+          <a:prstGeom prst="rect">
+            <a:avLst/>
+          </a:prstGeom>
+          <a:noFill/>
+        </p:spPr>
+        <p:txBody>
+          <a:bodyPr wrap="none" rtlCol="0">
+            <a:spAutoFit/>
+          </a:bodyPr>
+          <a:lstStyle/>
+          <a:p>
+            <a:r>
+              <a:rPr lang="en-US" dirty="0"/>
+              <a:t>time</a:t>
+            </a:r>
+          </a:p>
+        </p:txBody>
+      </p:sp>
+      <p:sp>
+        <p:nvSpPr>
+          <p:cNvPr id="13" name="Right Brace 12">
+            <a:extLst>
+              <a:ext uri="{FF2B5EF4-FFF2-40B4-BE49-F238E27FC236}">
+                <a16:creationId xmlns:a16="http://schemas.microsoft.com/office/drawing/2014/main" id="{1ADF5681-53FC-824C-B9FC-A7102D2C020A}"/>
+              </a:ext>
+            </a:extLst>
+          </p:cNvPr>
+          <p:cNvSpPr/>
+          <p:nvPr/>
+        </p:nvSpPr>
+        <p:spPr>
+          <a:xfrm rot="5400000">
+            <a:off x="3019290" y="3174244"/>
+            <a:ext cx="457200" cy="3334634"/>
+          </a:xfrm>
+          <a:prstGeom prst="rightBrace">
+            <a:avLst/>
+          </a:prstGeom>
+          <a:ln w="38100">
+            <a:solidFill>
+              <a:schemeClr val="tx2"/>
+            </a:solidFill>
+          </a:ln>
+        </p:spPr>
+        <p:style>
+          <a:lnRef idx="1">
+            <a:schemeClr val="accent1"/>
+          </a:lnRef>
+          <a:fillRef idx="0">
+            <a:schemeClr val="accent1"/>
+          </a:fillRef>
+          <a:effectRef idx="0">
+            <a:schemeClr val="accent1"/>
+          </a:effectRef>
+          <a:fontRef idx="minor">
+            <a:schemeClr val="tx1"/>
+          </a:fontRef>
+        </p:style>
+        <p:txBody>
+          <a:bodyPr rtlCol="0" anchor="ctr"/>
+          <a:lstStyle/>
+          <a:p>
+            <a:pPr algn="ctr"/>
+            <a:endParaRPr lang="en-US"/>
+          </a:p>
+        </p:txBody>
+      </p:sp>
+      <p:sp>
+        <p:nvSpPr>
+          <p:cNvPr id="14" name="TextBox 13">
+            <a:extLst>
+              <a:ext uri="{FF2B5EF4-FFF2-40B4-BE49-F238E27FC236}">
+                <a16:creationId xmlns:a16="http://schemas.microsoft.com/office/drawing/2014/main" id="{EF44AEE0-8D2B-2B48-842E-C991410615FC}"/>
+              </a:ext>
+            </a:extLst>
+          </p:cNvPr>
+          <p:cNvSpPr txBox="1"/>
+          <p:nvPr/>
+        </p:nvSpPr>
+        <p:spPr>
+          <a:xfrm>
+            <a:off x="1670748" y="5298449"/>
+            <a:ext cx="3070584" cy="369332"/>
+          </a:xfrm>
+          <a:prstGeom prst="rect">
+            <a:avLst/>
+          </a:prstGeom>
+          <a:noFill/>
+        </p:spPr>
+        <p:txBody>
+          <a:bodyPr wrap="none" rtlCol="0">
+            <a:spAutoFit/>
+          </a:bodyPr>
+          <a:lstStyle/>
+          <a:p>
+            <a:r>
+              <a:rPr lang="en-US" dirty="0"/>
+              <a:t>Interval specified in the plug in</a:t>
+            </a:r>
+          </a:p>
+        </p:txBody>
+      </p:sp>
+    </p:spTree>
+    <p:extLst>
+      <p:ext uri="{BB962C8B-B14F-4D97-AF65-F5344CB8AC3E}">
+        <p14:creationId xmlns:p14="http://schemas.microsoft.com/office/powerpoint/2010/main" val="1515162943"/>
+      </p:ext>
+    </p:extLst>
+  </p:cSld>
+  <p:clrMapOvr>
+    <a:masterClrMapping/>
+  </p:clrMapOvr>
+</p:sld>
+</file>
+
 <file path=ppt/theme/theme1.xml><?xml version="1.0" encoding="utf-8"?>
 <a:theme xmlns:a="http://schemas.openxmlformats.org/drawingml/2006/main" name="Office Theme">
   <a:themeElements>

</xml_diff>